<commit_message>
update user sweep instruction
</commit_message>
<xml_diff>
--- a/example/RGF solver document.pptx
+++ b/example/RGF solver document.pptx
@@ -10,7 +10,8 @@
     <p:sldId id="258" r:id="rId4"/>
     <p:sldId id="259" r:id="rId5"/>
     <p:sldId id="260" r:id="rId6"/>
-    <p:sldId id="261" r:id="rId7"/>
+    <p:sldId id="262" r:id="rId7"/>
+    <p:sldId id="261" r:id="rId8"/>
   </p:sldIdLst>
   <p:sldSz cx="12192000" cy="6858000"/>
   <p:notesSz cx="6858000" cy="9144000"/>
@@ -109,6 +110,11 @@
       </a:defRPr>
     </a:lvl9pPr>
   </p:defaultTextStyle>
+  <p:extLst>
+    <p:ext uri="{EFAFB233-063F-42B5-8137-9DF3F51BA10A}">
+      <p15:sldGuideLst xmlns:p15="http://schemas.microsoft.com/office/powerpoint/2012/main"/>
+    </p:ext>
+  </p:extLst>
 </p:presentation>
 </file>
 
@@ -835,7 +841,7 @@
             <a:fld id="{B61BEF0D-F0BB-DE4B-95CE-6DB70DBA9567}" type="datetimeFigureOut">
               <a:rPr lang="en-US" dirty="0"/>
               <a:pPr/>
-              <a:t>9/29/2019</a:t>
+              <a:t>9/30/2019</a:t>
             </a:fld>
             <a:endParaRPr lang="en-US" dirty="0"/>
           </a:p>
@@ -1083,7 +1089,7 @@
             <a:fld id="{B61BEF0D-F0BB-DE4B-95CE-6DB70DBA9567}" type="datetimeFigureOut">
               <a:rPr lang="en-US" dirty="0"/>
               <a:pPr/>
-              <a:t>9/29/2019</a:t>
+              <a:t>9/30/2019</a:t>
             </a:fld>
             <a:endParaRPr lang="en-US" dirty="0"/>
           </a:p>
@@ -1394,7 +1400,7 @@
             <a:fld id="{B61BEF0D-F0BB-DE4B-95CE-6DB70DBA9567}" type="datetimeFigureOut">
               <a:rPr lang="en-US" dirty="0"/>
               <a:pPr/>
-              <a:t>9/29/2019</a:t>
+              <a:t>9/30/2019</a:t>
             </a:fld>
             <a:endParaRPr lang="en-US" dirty="0"/>
           </a:p>
@@ -1732,7 +1738,7 @@
             <a:fld id="{B61BEF0D-F0BB-DE4B-95CE-6DB70DBA9567}" type="datetimeFigureOut">
               <a:rPr lang="en-US" dirty="0"/>
               <a:pPr/>
-              <a:t>9/29/2019</a:t>
+              <a:t>9/30/2019</a:t>
             </a:fld>
             <a:endParaRPr lang="en-US" dirty="0"/>
           </a:p>
@@ -2043,7 +2049,7 @@
             <a:fld id="{B61BEF0D-F0BB-DE4B-95CE-6DB70DBA9567}" type="datetimeFigureOut">
               <a:rPr lang="en-US" dirty="0"/>
               <a:pPr/>
-              <a:t>9/29/2019</a:t>
+              <a:t>9/30/2019</a:t>
             </a:fld>
             <a:endParaRPr lang="en-US" dirty="0"/>
           </a:p>
@@ -2433,7 +2439,7 @@
             <a:fld id="{B61BEF0D-F0BB-DE4B-95CE-6DB70DBA9567}" type="datetimeFigureOut">
               <a:rPr lang="en-US" dirty="0"/>
               <a:pPr/>
-              <a:t>9/29/2019</a:t>
+              <a:t>9/30/2019</a:t>
             </a:fld>
             <a:endParaRPr lang="en-US" dirty="0"/>
           </a:p>
@@ -2599,7 +2605,7 @@
           <a:p>
             <a:fld id="{55C6B4A9-1611-4792-9094-5F34BCA07E0B}" type="datetimeFigureOut">
               <a:rPr lang="en-US" dirty="0"/>
-              <a:t>9/29/2019</a:t>
+              <a:t>9/30/2019</a:t>
             </a:fld>
             <a:endParaRPr lang="en-US" dirty="0"/>
           </a:p>
@@ -2775,7 +2781,7 @@
             <a:fld id="{B61BEF0D-F0BB-DE4B-95CE-6DB70DBA9567}" type="datetimeFigureOut">
               <a:rPr lang="en-US" dirty="0"/>
               <a:pPr/>
-              <a:t>9/29/2019</a:t>
+              <a:t>9/30/2019</a:t>
             </a:fld>
             <a:endParaRPr lang="en-US" dirty="0"/>
           </a:p>
@@ -2948,7 +2954,7 @@
             <a:fld id="{B61BEF0D-F0BB-DE4B-95CE-6DB70DBA9567}" type="datetimeFigureOut">
               <a:rPr lang="en-US" dirty="0"/>
               <a:pPr/>
-              <a:t>9/29/2019</a:t>
+              <a:t>9/30/2019</a:t>
             </a:fld>
             <a:endParaRPr lang="en-US" dirty="0"/>
           </a:p>
@@ -3192,7 +3198,7 @@
             <a:fld id="{B61BEF0D-F0BB-DE4B-95CE-6DB70DBA9567}" type="datetimeFigureOut">
               <a:rPr lang="en-US" dirty="0"/>
               <a:pPr/>
-              <a:t>9/29/2019</a:t>
+              <a:t>9/30/2019</a:t>
             </a:fld>
             <a:endParaRPr lang="en-US" dirty="0"/>
           </a:p>
@@ -3420,7 +3426,7 @@
           <a:p>
             <a:fld id="{EB712588-04B1-427B-82EE-E8DB90309F08}" type="datetimeFigureOut">
               <a:rPr lang="en-US" dirty="0"/>
-              <a:t>9/29/2019</a:t>
+              <a:t>9/30/2019</a:t>
             </a:fld>
             <a:endParaRPr lang="en-US" dirty="0"/>
           </a:p>
@@ -3790,7 +3796,7 @@
             <a:fld id="{B61BEF0D-F0BB-DE4B-95CE-6DB70DBA9567}" type="datetimeFigureOut">
               <a:rPr lang="en-US" dirty="0"/>
               <a:pPr/>
-              <a:t>9/29/2019</a:t>
+              <a:t>9/30/2019</a:t>
             </a:fld>
             <a:endParaRPr lang="en-US" dirty="0"/>
           </a:p>
@@ -3910,7 +3916,7 @@
             <a:fld id="{B61BEF0D-F0BB-DE4B-95CE-6DB70DBA9567}" type="datetimeFigureOut">
               <a:rPr lang="en-US" dirty="0"/>
               <a:pPr/>
-              <a:t>9/29/2019</a:t>
+              <a:t>9/30/2019</a:t>
             </a:fld>
             <a:endParaRPr lang="en-US" dirty="0"/>
           </a:p>
@@ -4002,7 +4008,7 @@
             <a:fld id="{B61BEF0D-F0BB-DE4B-95CE-6DB70DBA9567}" type="datetimeFigureOut">
               <a:rPr lang="en-US" dirty="0"/>
               <a:pPr/>
-              <a:t>9/29/2019</a:t>
+              <a:t>9/30/2019</a:t>
             </a:fld>
             <a:endParaRPr lang="en-US" dirty="0"/>
           </a:p>
@@ -4253,7 +4259,7 @@
           <a:p>
             <a:fld id="{42A54C80-263E-416B-A8E0-580EDEADCBDC}" type="datetimeFigureOut">
               <a:rPr lang="en-US" dirty="0"/>
-              <a:t>9/29/2019</a:t>
+              <a:t>9/30/2019</a:t>
             </a:fld>
             <a:endParaRPr lang="en-US" dirty="0"/>
           </a:p>
@@ -4512,7 +4518,7 @@
             <a:fld id="{B61BEF0D-F0BB-DE4B-95CE-6DB70DBA9567}" type="datetimeFigureOut">
               <a:rPr lang="en-US" dirty="0"/>
               <a:pPr/>
-              <a:t>9/29/2019</a:t>
+              <a:t>9/30/2019</a:t>
             </a:fld>
             <a:endParaRPr lang="en-US" dirty="0"/>
           </a:p>
@@ -5252,7 +5258,7 @@
             <a:fld id="{B61BEF0D-F0BB-DE4B-95CE-6DB70DBA9567}" type="datetimeFigureOut">
               <a:rPr lang="en-US" dirty="0"/>
               <a:pPr/>
-              <a:t>9/29/2019</a:t>
+              <a:t>9/30/2019</a:t>
             </a:fld>
             <a:endParaRPr lang="en-US" dirty="0"/>
           </a:p>
@@ -8361,6 +8367,187 @@
           <p:cNvPr id="2" name="標題 1">
             <a:extLst>
               <a:ext uri="{FF2B5EF4-FFF2-40B4-BE49-F238E27FC236}">
+                <a16:creationId xmlns:a16="http://schemas.microsoft.com/office/drawing/2014/main" id="{25B27FC6-ABD6-4DD9-8F29-8C35D5C75170}"/>
+              </a:ext>
+            </a:extLst>
+          </p:cNvPr>
+          <p:cNvSpPr>
+            <a:spLocks noGrp="1"/>
+          </p:cNvSpPr>
+          <p:nvPr>
+            <p:ph type="title"/>
+          </p:nvPr>
+        </p:nvSpPr>
+        <p:spPr/>
+        <p:txBody>
+          <a:bodyPr/>
+          <a:lstStyle/>
+          <a:p>
+            <a:r>
+              <a:rPr lang="en-US" altLang="zh-TW" dirty="0"/>
+              <a:t>Setup file</a:t>
+            </a:r>
+            <a:endParaRPr lang="zh-TW" altLang="en-US" dirty="0"/>
+          </a:p>
+        </p:txBody>
+      </p:sp>
+      <p:sp>
+        <p:nvSpPr>
+          <p:cNvPr id="3" name="內容版面配置區 2">
+            <a:extLst>
+              <a:ext uri="{FF2B5EF4-FFF2-40B4-BE49-F238E27FC236}">
+                <a16:creationId xmlns:a16="http://schemas.microsoft.com/office/drawing/2014/main" id="{9CD2BA41-CE9D-4CC4-987E-9FD54E022250}"/>
+              </a:ext>
+            </a:extLst>
+          </p:cNvPr>
+          <p:cNvSpPr>
+            <a:spLocks noGrp="1"/>
+          </p:cNvSpPr>
+          <p:nvPr>
+            <p:ph idx="1"/>
+          </p:nvPr>
+        </p:nvSpPr>
+        <p:spPr>
+          <a:xfrm>
+            <a:off x="677334" y="2160589"/>
+            <a:ext cx="8596668" cy="4503101"/>
+          </a:xfrm>
+        </p:spPr>
+        <p:txBody>
+          <a:bodyPr>
+            <a:normAutofit/>
+          </a:bodyPr>
+          <a:lstStyle/>
+          <a:p>
+            <a:r>
+              <a:rPr lang="en-US" altLang="zh-TW" dirty="0"/>
+              <a:t>Sweep parameter:</a:t>
+            </a:r>
+          </a:p>
+          <a:p>
+            <a:pPr lvl="1"/>
+            <a:r>
+              <a:rPr lang="en-US" altLang="zh-TW" dirty="0"/>
+              <a:t>Available items: shift, width, length, </a:t>
+            </a:r>
+            <a:r>
+              <a:rPr lang="en-US" altLang="zh-TW" dirty="0" err="1"/>
+              <a:t>Vtop</a:t>
+            </a:r>
+            <a:r>
+              <a:rPr lang="en-US" altLang="zh-TW" dirty="0"/>
+              <a:t>, </a:t>
+            </a:r>
+            <a:r>
+              <a:rPr lang="en-US" altLang="zh-TW" dirty="0" err="1"/>
+              <a:t>Vbot</a:t>
+            </a:r>
+            <a:r>
+              <a:rPr lang="en-US" altLang="zh-TW" dirty="0"/>
+              <a:t>, gap.</a:t>
+            </a:r>
+          </a:p>
+          <a:p>
+            <a:pPr lvl="2"/>
+            <a:r>
+              <a:rPr lang="en-US" altLang="zh-TW" dirty="0">
+                <a:solidFill>
+                  <a:srgbClr val="FF0000"/>
+                </a:solidFill>
+              </a:rPr>
+              <a:t>For structure sweep, please proceed with caution because this may raise matrix mismatch error</a:t>
+            </a:r>
+            <a:r>
+              <a:rPr lang="en-US" altLang="zh-TW" dirty="0"/>
+              <a:t>.</a:t>
+            </a:r>
+          </a:p>
+          <a:p>
+            <a:pPr lvl="1"/>
+            <a:r>
+              <a:rPr lang="en-US" altLang="zh-TW" dirty="0"/>
+              <a:t>Values:</a:t>
+            </a:r>
+          </a:p>
+          <a:p>
+            <a:pPr lvl="2"/>
+            <a:r>
+              <a:rPr lang="en-US" altLang="zh-TW" dirty="0"/>
+              <a:t>Same input rule as </a:t>
+            </a:r>
+            <a:r>
+              <a:rPr lang="en-US" altLang="zh-TW"/>
+              <a:t>“band”.</a:t>
+            </a:r>
+            <a:endParaRPr lang="en-US" altLang="zh-TW" dirty="0"/>
+          </a:p>
+        </p:txBody>
+      </p:sp>
+      <p:pic>
+        <p:nvPicPr>
+          <p:cNvPr id="5" name="內容版面配置區 3">
+            <a:extLst>
+              <a:ext uri="{FF2B5EF4-FFF2-40B4-BE49-F238E27FC236}">
+                <a16:creationId xmlns:a16="http://schemas.microsoft.com/office/drawing/2014/main" id="{776C7CB3-0997-4BC4-B363-C86C1C7AE021}"/>
+              </a:ext>
+            </a:extLst>
+          </p:cNvPr>
+          <p:cNvPicPr>
+            <a:picLocks noChangeAspect="1"/>
+          </p:cNvPicPr>
+          <p:nvPr/>
+        </p:nvPicPr>
+        <p:blipFill>
+          <a:blip r:embed="rId2"/>
+          <a:stretch>
+            <a:fillRect/>
+          </a:stretch>
+        </p:blipFill>
+        <p:spPr>
+          <a:xfrm>
+            <a:off x="2917998" y="360680"/>
+            <a:ext cx="8969830" cy="1569720"/>
+          </a:xfrm>
+          <a:prstGeom prst="rect">
+            <a:avLst/>
+          </a:prstGeom>
+        </p:spPr>
+      </p:pic>
+    </p:spTree>
+    <p:extLst>
+      <p:ext uri="{BB962C8B-B14F-4D97-AF65-F5344CB8AC3E}">
+        <p14:creationId xmlns:p14="http://schemas.microsoft.com/office/powerpoint/2010/main" val="2194568303"/>
+      </p:ext>
+    </p:extLst>
+  </p:cSld>
+  <p:clrMapOvr>
+    <a:masterClrMapping/>
+  </p:clrMapOvr>
+</p:sld>
+</file>
+
+<file path=ppt/slides/slide7.xml><?xml version="1.0" encoding="utf-8"?>
+<p:sld xmlns:a="http://schemas.openxmlformats.org/drawingml/2006/main" xmlns:r="http://schemas.openxmlformats.org/officeDocument/2006/relationships" xmlns:p="http://schemas.openxmlformats.org/presentationml/2006/main">
+  <p:cSld>
+    <p:spTree>
+      <p:nvGrpSpPr>
+        <p:cNvPr id="1" name=""/>
+        <p:cNvGrpSpPr/>
+        <p:nvPr/>
+      </p:nvGrpSpPr>
+      <p:grpSpPr>
+        <a:xfrm>
+          <a:off x="0" y="0"/>
+          <a:ext cx="0" cy="0"/>
+          <a:chOff x="0" y="0"/>
+          <a:chExt cx="0" cy="0"/>
+        </a:xfrm>
+      </p:grpSpPr>
+      <p:sp>
+        <p:nvSpPr>
+          <p:cNvPr id="2" name="標題 1">
+            <a:extLst>
+              <a:ext uri="{FF2B5EF4-FFF2-40B4-BE49-F238E27FC236}">
                 <a16:creationId xmlns:a16="http://schemas.microsoft.com/office/drawing/2014/main" id="{A596E546-C36C-4BC7-B0C6-14D5D3EE8848}"/>
               </a:ext>
             </a:extLst>

</xml_diff>